<commit_message>
added third bullet to potential improvements slide
</commit_message>
<xml_diff>
--- a/w207_ProjectPizza_Presentation.pptx
+++ b/w207_ProjectPizza_Presentation.pptx
@@ -6074,14 +6074,14 @@
       </dgm:t>
     </dgm:pt>
     <dgm:pt modelId="{E48D09E9-8381-4052-A82E-FA09F715E532}">
-      <dgm:prSet/>
+      <dgm:prSet custT="1"/>
       <dgm:spPr/>
       <dgm:t>
         <a:bodyPr/>
         <a:lstStyle/>
         <a:p>
           <a:r>
-            <a:rPr lang="en-US" dirty="0">
+            <a:rPr lang="en-US" sz="2000" dirty="0">
               <a:solidFill>
                 <a:schemeClr val="bg2"/>
               </a:solidFill>
@@ -6114,19 +6114,19 @@
       </dgm:t>
     </dgm:pt>
     <dgm:pt modelId="{289E3083-C720-48CB-99D5-2DF9937A6DE0}">
-      <dgm:prSet/>
+      <dgm:prSet custT="1"/>
       <dgm:spPr/>
       <dgm:t>
         <a:bodyPr/>
         <a:lstStyle/>
         <a:p>
           <a:r>
-            <a:rPr lang="en-US" dirty="0">
+            <a:rPr lang="en-US" sz="2000" dirty="0">
               <a:solidFill>
                 <a:schemeClr val="bg2"/>
               </a:solidFill>
             </a:rPr>
-            <a:t>We also could have used more sophisticated methods to balance out our training &amp; development datasets so there was a better ratio of positive &amp; negative datapoints</a:t>
+            <a:t>We also could have used more sophisticated sampling methods to balance negative/positive observations</a:t>
           </a:r>
         </a:p>
       </dgm:t>
@@ -6143,6 +6143,46 @@
       </dgm:t>
     </dgm:pt>
     <dgm:pt modelId="{A13CD6D1-445C-4EEA-8458-40C1928FE026}" type="sibTrans" cxnId="{E40FC667-5885-4A02-B7A1-BAA7FD1F5559}">
+      <dgm:prSet/>
+      <dgm:spPr/>
+      <dgm:t>
+        <a:bodyPr/>
+        <a:lstStyle/>
+        <a:p>
+          <a:endParaRPr lang="en-US"/>
+        </a:p>
+      </dgm:t>
+    </dgm:pt>
+    <dgm:pt modelId="{1275454F-1F12-458B-ACC2-A32C5396691A}">
+      <dgm:prSet custT="1"/>
+      <dgm:spPr/>
+      <dgm:t>
+        <a:bodyPr/>
+        <a:lstStyle/>
+        <a:p>
+          <a:r>
+            <a:rPr lang="en-US" sz="2000" dirty="0">
+              <a:solidFill>
+                <a:schemeClr val="bg2"/>
+              </a:solidFill>
+            </a:rPr>
+            <a:t>Experimenting with linear, isotonic, and other calibration methods to improve model recall</a:t>
+          </a:r>
+        </a:p>
+      </dgm:t>
+    </dgm:pt>
+    <dgm:pt modelId="{8CEA19DF-3CDD-4ECF-AC28-A68F44708CD4}" type="parTrans" cxnId="{74F45C2A-D5ED-4E8E-9768-B942A0E13951}">
+      <dgm:prSet/>
+      <dgm:spPr/>
+      <dgm:t>
+        <a:bodyPr/>
+        <a:lstStyle/>
+        <a:p>
+          <a:endParaRPr lang="en-US"/>
+        </a:p>
+      </dgm:t>
+    </dgm:pt>
+    <dgm:pt modelId="{FC2DDBD9-8588-4784-9761-DC8F50362C42}" type="sibTrans" cxnId="{74F45C2A-D5ED-4E8E-9768-B942A0E13951}">
       <dgm:prSet/>
       <dgm:spPr/>
       <dgm:t>
@@ -6179,7 +6219,7 @@
       <dgm:spPr/>
     </dgm:pt>
     <dgm:pt modelId="{688A05E1-4739-934B-AF19-43E3A8B4BFCB}" type="pres">
-      <dgm:prSet presAssocID="{E48D09E9-8381-4052-A82E-FA09F715E532}" presName="rootText1" presStyleLbl="node0" presStyleIdx="0" presStyleCnt="2">
+      <dgm:prSet presAssocID="{E48D09E9-8381-4052-A82E-FA09F715E532}" presName="rootText1" presStyleLbl="node0" presStyleIdx="0" presStyleCnt="3" custScaleX="100024" custScaleY="65472" custLinFactNeighborX="-12" custLinFactNeighborY="-14034">
         <dgm:presLayoutVars>
           <dgm:chPref val="3"/>
         </dgm:presLayoutVars>
@@ -6211,7 +6251,7 @@
       <dgm:spPr/>
     </dgm:pt>
     <dgm:pt modelId="{1D7DCE69-4E24-B342-8045-461A4F642C4C}" type="pres">
-      <dgm:prSet presAssocID="{289E3083-C720-48CB-99D5-2DF9937A6DE0}" presName="rootText1" presStyleLbl="node0" presStyleIdx="1" presStyleCnt="2">
+      <dgm:prSet presAssocID="{289E3083-C720-48CB-99D5-2DF9937A6DE0}" presName="rootText1" presStyleLbl="node0" presStyleIdx="1" presStyleCnt="3" custScaleY="71474" custLinFactNeighborX="12" custLinFactNeighborY="-24296">
         <dgm:presLayoutVars>
           <dgm:chPref val="3"/>
         </dgm:presLayoutVars>
@@ -6230,13 +6270,48 @@
       <dgm:prSet presAssocID="{289E3083-C720-48CB-99D5-2DF9937A6DE0}" presName="hierChild3" presStyleCnt="0"/>
       <dgm:spPr/>
     </dgm:pt>
+    <dgm:pt modelId="{3CC8F9C6-53A4-432E-BFDC-5C7295F02C43}" type="pres">
+      <dgm:prSet presAssocID="{1275454F-1F12-458B-ACC2-A32C5396691A}" presName="hierRoot1" presStyleCnt="0">
+        <dgm:presLayoutVars>
+          <dgm:hierBranch val="init"/>
+        </dgm:presLayoutVars>
+      </dgm:prSet>
+      <dgm:spPr/>
+    </dgm:pt>
+    <dgm:pt modelId="{B2B28514-1765-46F9-94A6-42AC4B93152F}" type="pres">
+      <dgm:prSet presAssocID="{1275454F-1F12-458B-ACC2-A32C5396691A}" presName="rootComposite1" presStyleCnt="0"/>
+      <dgm:spPr/>
+    </dgm:pt>
+    <dgm:pt modelId="{A17DA83D-D1E5-4CBB-80BA-B24CC46929C4}" type="pres">
+      <dgm:prSet presAssocID="{1275454F-1F12-458B-ACC2-A32C5396691A}" presName="rootText1" presStyleLbl="node0" presStyleIdx="2" presStyleCnt="3" custScaleY="45624" custLinFactNeighborX="12" custLinFactNeighborY="-27190">
+        <dgm:presLayoutVars>
+          <dgm:chPref val="3"/>
+        </dgm:presLayoutVars>
+      </dgm:prSet>
+      <dgm:spPr/>
+    </dgm:pt>
+    <dgm:pt modelId="{168E5E75-B934-4AC5-B623-17FD16D29679}" type="pres">
+      <dgm:prSet presAssocID="{1275454F-1F12-458B-ACC2-A32C5396691A}" presName="rootConnector1" presStyleLbl="node1" presStyleIdx="0" presStyleCnt="0"/>
+      <dgm:spPr/>
+    </dgm:pt>
+    <dgm:pt modelId="{4880099F-242F-4E16-B201-D4453E2FB56B}" type="pres">
+      <dgm:prSet presAssocID="{1275454F-1F12-458B-ACC2-A32C5396691A}" presName="hierChild2" presStyleCnt="0"/>
+      <dgm:spPr/>
+    </dgm:pt>
+    <dgm:pt modelId="{15EC3EC2-A130-4AD0-BB87-CBD249F4CD89}" type="pres">
+      <dgm:prSet presAssocID="{1275454F-1F12-458B-ACC2-A32C5396691A}" presName="hierChild3" presStyleCnt="0"/>
+      <dgm:spPr/>
+    </dgm:pt>
   </dgm:ptLst>
   <dgm:cxnLst>
     <dgm:cxn modelId="{38A83819-6AD1-1349-8EA5-3D9A4178BDDF}" type="presOf" srcId="{E48D09E9-8381-4052-A82E-FA09F715E532}" destId="{7F3C12DF-7FC8-C749-81FF-0B87E20BD5C0}" srcOrd="1" destOrd="0" presId="urn:microsoft.com/office/officeart/2009/3/layout/HorizontalOrganizationChart"/>
+    <dgm:cxn modelId="{74F45C2A-D5ED-4E8E-9768-B942A0E13951}" srcId="{108EEC92-30F1-4ECE-B40E-52038F08B2BE}" destId="{1275454F-1F12-458B-ACC2-A32C5396691A}" srcOrd="2" destOrd="0" parTransId="{8CEA19DF-3CDD-4ECF-AC28-A68F44708CD4}" sibTransId="{FC2DDBD9-8588-4784-9761-DC8F50362C42}"/>
     <dgm:cxn modelId="{E40FC667-5885-4A02-B7A1-BAA7FD1F5559}" srcId="{108EEC92-30F1-4ECE-B40E-52038F08B2BE}" destId="{289E3083-C720-48CB-99D5-2DF9937A6DE0}" srcOrd="1" destOrd="0" parTransId="{DD19D687-5D70-4F9C-887A-38E023955F5D}" sibTransId="{A13CD6D1-445C-4EEA-8458-40C1928FE026}"/>
     <dgm:cxn modelId="{1456BA71-84A0-D246-8188-7C82A1C489A8}" type="presOf" srcId="{108EEC92-30F1-4ECE-B40E-52038F08B2BE}" destId="{ABA90EAA-B058-C441-A204-87DC8FB68D82}" srcOrd="0" destOrd="0" presId="urn:microsoft.com/office/officeart/2009/3/layout/HorizontalOrganizationChart"/>
     <dgm:cxn modelId="{BB11E57F-7882-654C-9345-111B043F5AB3}" type="presOf" srcId="{289E3083-C720-48CB-99D5-2DF9937A6DE0}" destId="{1D7DCE69-4E24-B342-8045-461A4F642C4C}" srcOrd="0" destOrd="0" presId="urn:microsoft.com/office/officeart/2009/3/layout/HorizontalOrganizationChart"/>
     <dgm:cxn modelId="{AC0B1A83-8CE8-3142-B9AD-EEEF0C59049C}" type="presOf" srcId="{E48D09E9-8381-4052-A82E-FA09F715E532}" destId="{688A05E1-4739-934B-AF19-43E3A8B4BFCB}" srcOrd="0" destOrd="0" presId="urn:microsoft.com/office/officeart/2009/3/layout/HorizontalOrganizationChart"/>
+    <dgm:cxn modelId="{F2C627A8-A330-4072-BBF9-AAF82EFCFD8E}" type="presOf" srcId="{1275454F-1F12-458B-ACC2-A32C5396691A}" destId="{168E5E75-B934-4AC5-B623-17FD16D29679}" srcOrd="1" destOrd="0" presId="urn:microsoft.com/office/officeart/2009/3/layout/HorizontalOrganizationChart"/>
+    <dgm:cxn modelId="{92759ACB-8682-4209-AD6A-045FDDAF9A86}" type="presOf" srcId="{1275454F-1F12-458B-ACC2-A32C5396691A}" destId="{A17DA83D-D1E5-4CBB-80BA-B24CC46929C4}" srcOrd="0" destOrd="0" presId="urn:microsoft.com/office/officeart/2009/3/layout/HorizontalOrganizationChart"/>
     <dgm:cxn modelId="{BC38E3D3-6B45-4534-A801-BE4FE7CA7368}" srcId="{108EEC92-30F1-4ECE-B40E-52038F08B2BE}" destId="{E48D09E9-8381-4052-A82E-FA09F715E532}" srcOrd="0" destOrd="0" parTransId="{EBA38A7A-707E-4376-BDB2-82DC045A9885}" sibTransId="{7C144AF8-53B2-4C67-BDFB-135318F7853F}"/>
     <dgm:cxn modelId="{D20454F4-7739-774C-86E7-09C58A668977}" type="presOf" srcId="{289E3083-C720-48CB-99D5-2DF9937A6DE0}" destId="{7EDD2F4E-F7F8-C547-A7EE-CC165362B1B4}" srcOrd="1" destOrd="0" presId="urn:microsoft.com/office/officeart/2009/3/layout/HorizontalOrganizationChart"/>
     <dgm:cxn modelId="{D60BC2F6-61E3-1F4D-92C5-83EC6641F33A}" type="presParOf" srcId="{ABA90EAA-B058-C441-A204-87DC8FB68D82}" destId="{AA3B4D4C-13A8-744C-99C6-7BEC00FED94D}" srcOrd="0" destOrd="0" presId="urn:microsoft.com/office/officeart/2009/3/layout/HorizontalOrganizationChart"/>
@@ -6251,6 +6326,12 @@
     <dgm:cxn modelId="{8EDA802D-AB68-944E-85C0-BCF216501752}" type="presParOf" srcId="{CE0CCEBE-75C8-0F4B-A368-094F483C201D}" destId="{7EDD2F4E-F7F8-C547-A7EE-CC165362B1B4}" srcOrd="1" destOrd="0" presId="urn:microsoft.com/office/officeart/2009/3/layout/HorizontalOrganizationChart"/>
     <dgm:cxn modelId="{48EEC222-360D-2F4E-9467-969CE9196422}" type="presParOf" srcId="{25109815-2CA1-0449-9C69-20DBCD66596B}" destId="{1FB6F86F-11A7-064C-B27C-7E0E37B4F9DA}" srcOrd="1" destOrd="0" presId="urn:microsoft.com/office/officeart/2009/3/layout/HorizontalOrganizationChart"/>
     <dgm:cxn modelId="{8606FC7F-893C-AB43-B84A-6C6B16CB33B3}" type="presParOf" srcId="{25109815-2CA1-0449-9C69-20DBCD66596B}" destId="{8F6D6882-D9AD-CC4E-A465-72BF77F386F0}" srcOrd="2" destOrd="0" presId="urn:microsoft.com/office/officeart/2009/3/layout/HorizontalOrganizationChart"/>
+    <dgm:cxn modelId="{616DC48D-947A-4E3F-8D4D-6755359FF4C2}" type="presParOf" srcId="{ABA90EAA-B058-C441-A204-87DC8FB68D82}" destId="{3CC8F9C6-53A4-432E-BFDC-5C7295F02C43}" srcOrd="2" destOrd="0" presId="urn:microsoft.com/office/officeart/2009/3/layout/HorizontalOrganizationChart"/>
+    <dgm:cxn modelId="{A041A0BA-A015-42A2-9D24-16B7B4178770}" type="presParOf" srcId="{3CC8F9C6-53A4-432E-BFDC-5C7295F02C43}" destId="{B2B28514-1765-46F9-94A6-42AC4B93152F}" srcOrd="0" destOrd="0" presId="urn:microsoft.com/office/officeart/2009/3/layout/HorizontalOrganizationChart"/>
+    <dgm:cxn modelId="{742EB408-69FA-4ED0-891C-B7D4793D2987}" type="presParOf" srcId="{B2B28514-1765-46F9-94A6-42AC4B93152F}" destId="{A17DA83D-D1E5-4CBB-80BA-B24CC46929C4}" srcOrd="0" destOrd="0" presId="urn:microsoft.com/office/officeart/2009/3/layout/HorizontalOrganizationChart"/>
+    <dgm:cxn modelId="{6EF4EA94-A4A3-4CD8-B839-65712A8FFFBB}" type="presParOf" srcId="{B2B28514-1765-46F9-94A6-42AC4B93152F}" destId="{168E5E75-B934-4AC5-B623-17FD16D29679}" srcOrd="1" destOrd="0" presId="urn:microsoft.com/office/officeart/2009/3/layout/HorizontalOrganizationChart"/>
+    <dgm:cxn modelId="{4CD274C6-4A3A-4396-819C-9AD88D2C2DA9}" type="presParOf" srcId="{3CC8F9C6-53A4-432E-BFDC-5C7295F02C43}" destId="{4880099F-242F-4E16-B201-D4453E2FB56B}" srcOrd="1" destOrd="0" presId="urn:microsoft.com/office/officeart/2009/3/layout/HorizontalOrganizationChart"/>
+    <dgm:cxn modelId="{B114E7CA-CBE4-45DD-9527-86702BAD1849}" type="presParOf" srcId="{3CC8F9C6-53A4-432E-BFDC-5C7295F02C43}" destId="{15EC3EC2-A130-4AD0-BB87-CBD249F4CD89}" srcOrd="2" destOrd="0" presId="urn:microsoft.com/office/officeart/2009/3/layout/HorizontalOrganizationChart"/>
   </dgm:cxnLst>
   <dgm:bg/>
   <dgm:whole/>
@@ -8216,8 +8297,8 @@
       </dsp:nvSpPr>
       <dsp:spPr>
         <a:xfrm>
-          <a:off x="762" y="491425"/>
-          <a:ext cx="6242467" cy="1903952"/>
+          <a:off x="0" y="0"/>
+          <a:ext cx="6243965" cy="1246555"/>
         </a:xfrm>
         <a:prstGeom prst="rect">
           <a:avLst/>
@@ -8273,12 +8354,12 @@
         </a:fontRef>
       </dsp:style>
       <dsp:txBody>
-        <a:bodyPr spcFirstLastPara="0" vert="horz" wrap="square" lIns="16510" tIns="16510" rIns="16510" bIns="16510" numCol="1" spcCol="1270" anchor="ctr" anchorCtr="0">
+        <a:bodyPr spcFirstLastPara="0" vert="horz" wrap="square" lIns="12700" tIns="12700" rIns="12700" bIns="12700" numCol="1" spcCol="1270" anchor="ctr" anchorCtr="0">
           <a:noAutofit/>
         </a:bodyPr>
         <a:lstStyle/>
         <a:p>
-          <a:pPr marL="0" lvl="0" indent="0" algn="ctr" defTabSz="1155700">
+          <a:pPr marL="0" lvl="0" indent="0" algn="ctr" defTabSz="889000">
             <a:lnSpc>
               <a:spcPct val="90000"/>
             </a:lnSpc>
@@ -8291,7 +8372,7 @@
             <a:buNone/>
           </a:pPr>
           <a:r>
-            <a:rPr lang="en-US" sz="2600" kern="1200" dirty="0">
+            <a:rPr lang="en-US" sz="2000" kern="1200" dirty="0">
               <a:solidFill>
                 <a:schemeClr val="bg2"/>
               </a:solidFill>
@@ -8301,8 +8382,8 @@
         </a:p>
       </dsp:txBody>
       <dsp:txXfrm>
-        <a:off x="762" y="491425"/>
-        <a:ext cx="6242467" cy="1903952"/>
+        <a:off x="0" y="0"/>
+        <a:ext cx="6243965" cy="1246555"/>
       </dsp:txXfrm>
     </dsp:sp>
     <dsp:sp modelId="{1D7DCE69-4E24-B342-8045-461A4F642C4C}">
@@ -8312,8 +8393,8 @@
       </dsp:nvSpPr>
       <dsp:spPr>
         <a:xfrm>
-          <a:off x="762" y="3175686"/>
-          <a:ext cx="6242467" cy="1903952"/>
+          <a:off x="762" y="1831480"/>
+          <a:ext cx="6242467" cy="1360831"/>
         </a:xfrm>
         <a:prstGeom prst="rect">
           <a:avLst/>
@@ -8369,12 +8450,12 @@
         </a:fontRef>
       </dsp:style>
       <dsp:txBody>
-        <a:bodyPr spcFirstLastPara="0" vert="horz" wrap="square" lIns="16510" tIns="16510" rIns="16510" bIns="16510" numCol="1" spcCol="1270" anchor="ctr" anchorCtr="0">
+        <a:bodyPr spcFirstLastPara="0" vert="horz" wrap="square" lIns="12700" tIns="12700" rIns="12700" bIns="12700" numCol="1" spcCol="1270" anchor="ctr" anchorCtr="0">
           <a:noAutofit/>
         </a:bodyPr>
         <a:lstStyle/>
         <a:p>
-          <a:pPr marL="0" lvl="0" indent="0" algn="ctr" defTabSz="1155700">
+          <a:pPr marL="0" lvl="0" indent="0" algn="ctr" defTabSz="889000">
             <a:lnSpc>
               <a:spcPct val="90000"/>
             </a:lnSpc>
@@ -8387,18 +8468,114 @@
             <a:buNone/>
           </a:pPr>
           <a:r>
-            <a:rPr lang="en-US" sz="2600" kern="1200" dirty="0">
+            <a:rPr lang="en-US" sz="2000" kern="1200" dirty="0">
               <a:solidFill>
                 <a:schemeClr val="bg2"/>
               </a:solidFill>
             </a:rPr>
-            <a:t>We also could have used more sophisticated methods to balance out our training &amp; development datasets so there was a better ratio of positive &amp; negative datapoints</a:t>
+            <a:t>We also could have used more sophisticated sampling methods to balance negative/positive observations</a:t>
           </a:r>
         </a:p>
       </dsp:txBody>
       <dsp:txXfrm>
-        <a:off x="762" y="3175686"/>
-        <a:ext cx="6242467" cy="1903952"/>
+        <a:off x="762" y="1831480"/>
+        <a:ext cx="6242467" cy="1360831"/>
+      </dsp:txXfrm>
+    </dsp:sp>
+    <dsp:sp modelId="{A17DA83D-D1E5-4CBB-80BA-B24CC46929C4}">
+      <dsp:nvSpPr>
+        <dsp:cNvPr id="0" name=""/>
+        <dsp:cNvSpPr/>
+      </dsp:nvSpPr>
+      <dsp:spPr>
+        <a:xfrm>
+          <a:off x="762" y="3917520"/>
+          <a:ext cx="6242467" cy="868659"/>
+        </a:xfrm>
+        <a:prstGeom prst="rect">
+          <a:avLst/>
+        </a:prstGeom>
+        <a:gradFill rotWithShape="0">
+          <a:gsLst>
+            <a:gs pos="0">
+              <a:schemeClr val="accent4">
+                <a:hueOff val="0"/>
+                <a:satOff val="0"/>
+                <a:lumOff val="0"/>
+                <a:alphaOff val="0"/>
+                <a:tint val="96000"/>
+                <a:lumMod val="104000"/>
+              </a:schemeClr>
+            </a:gs>
+            <a:gs pos="100000">
+              <a:schemeClr val="accent4">
+                <a:hueOff val="0"/>
+                <a:satOff val="0"/>
+                <a:lumOff val="0"/>
+                <a:alphaOff val="0"/>
+                <a:shade val="84000"/>
+                <a:lumMod val="84000"/>
+              </a:schemeClr>
+            </a:gs>
+          </a:gsLst>
+          <a:lin ang="5400000" scaled="0"/>
+        </a:gradFill>
+        <a:ln>
+          <a:noFill/>
+        </a:ln>
+        <a:effectLst>
+          <a:innerShdw blurRad="50800" dist="25400" dir="13500000">
+            <a:srgbClr val="000000">
+              <a:alpha val="55000"/>
+            </a:srgbClr>
+          </a:innerShdw>
+        </a:effectLst>
+      </dsp:spPr>
+      <dsp:style>
+        <a:lnRef idx="0">
+          <a:scrgbClr r="0" g="0" b="0"/>
+        </a:lnRef>
+        <a:fillRef idx="3">
+          <a:scrgbClr r="0" g="0" b="0"/>
+        </a:fillRef>
+        <a:effectRef idx="2">
+          <a:scrgbClr r="0" g="0" b="0"/>
+        </a:effectRef>
+        <a:fontRef idx="minor">
+          <a:schemeClr val="lt1"/>
+        </a:fontRef>
+      </dsp:style>
+      <dsp:txBody>
+        <a:bodyPr spcFirstLastPara="0" vert="horz" wrap="square" lIns="12700" tIns="12700" rIns="12700" bIns="12700" numCol="1" spcCol="1270" anchor="ctr" anchorCtr="0">
+          <a:noAutofit/>
+        </a:bodyPr>
+        <a:lstStyle/>
+        <a:p>
+          <a:pPr marL="0" lvl="0" indent="0" algn="ctr" defTabSz="889000">
+            <a:lnSpc>
+              <a:spcPct val="90000"/>
+            </a:lnSpc>
+            <a:spcBef>
+              <a:spcPct val="0"/>
+            </a:spcBef>
+            <a:spcAft>
+              <a:spcPct val="35000"/>
+            </a:spcAft>
+            <a:buNone/>
+          </a:pPr>
+          <a:r>
+            <a:rPr lang="en-US" sz="2000" kern="1200" dirty="0">
+              <a:solidFill>
+                <a:schemeClr val="bg2"/>
+              </a:solidFill>
+            </a:rPr>
+            <a:t>Experimenting with linear, isotonic, and other calibration methods to improve model recall</a:t>
+          </a:r>
+        </a:p>
+      </dsp:txBody>
+      <dsp:txXfrm>
+        <a:off x="762" y="3917520"/>
+        <a:ext cx="6242467" cy="868659"/>
       </dsp:txXfrm>
     </dsp:sp>
   </dsp:spTree>
@@ -19159,7 +19336,7 @@
           <a:p>
             <a:fld id="{74351BEC-B626-8A42-83F4-51CC6FB0CE48}" type="datetimeFigureOut">
               <a:rPr lang="en-US" smtClean="0"/>
-              <a:t>4/10/22</a:t>
+              <a:t>4/12/2022</a:t>
             </a:fld>
             <a:endParaRPr lang="en-US"/>
           </a:p>
@@ -20684,7 +20861,7 @@
           <a:p>
             <a:fld id="{B5898F52-2787-4BA2-BBBC-9395E9F86D50}" type="datetimeFigureOut">
               <a:rPr lang="en-US" smtClean="0"/>
-              <a:t>4/10/22</a:t>
+              <a:t>4/12/2022</a:t>
             </a:fld>
             <a:endParaRPr lang="en-US"/>
           </a:p>
@@ -20976,7 +21153,7 @@
             <a:fld id="{B5898F52-2787-4BA2-BBBC-9395E9F86D50}" type="datetimeFigureOut">
               <a:rPr lang="en-US" smtClean="0"/>
               <a:pPr/>
-              <a:t>4/10/22</a:t>
+              <a:t>4/12/2022</a:t>
             </a:fld>
             <a:endParaRPr lang="en-US" dirty="0"/>
           </a:p>
@@ -21237,7 +21414,7 @@
             <a:fld id="{B5898F52-2787-4BA2-BBBC-9395E9F86D50}" type="datetimeFigureOut">
               <a:rPr lang="en-US" smtClean="0"/>
               <a:pPr/>
-              <a:t>4/10/22</a:t>
+              <a:t>4/12/2022</a:t>
             </a:fld>
             <a:endParaRPr lang="en-US" dirty="0"/>
           </a:p>
@@ -21708,7 +21885,7 @@
             <a:fld id="{B5898F52-2787-4BA2-BBBC-9395E9F86D50}" type="datetimeFigureOut">
               <a:rPr lang="en-US" smtClean="0"/>
               <a:pPr/>
-              <a:t>4/10/22</a:t>
+              <a:t>4/12/2022</a:t>
             </a:fld>
             <a:endParaRPr lang="en-US" dirty="0"/>
           </a:p>
@@ -21890,7 +22067,7 @@
             <a:fld id="{B5898F52-2787-4BA2-BBBC-9395E9F86D50}" type="datetimeFigureOut">
               <a:rPr lang="en-US" smtClean="0"/>
               <a:pPr/>
-              <a:t>4/10/22</a:t>
+              <a:t>4/12/2022</a:t>
             </a:fld>
             <a:endParaRPr lang="en-US" dirty="0"/>
           </a:p>
@@ -22468,7 +22645,7 @@
             <a:fld id="{B5898F52-2787-4BA2-BBBC-9395E9F86D50}" type="datetimeFigureOut">
               <a:rPr lang="en-US" smtClean="0"/>
               <a:pPr/>
-              <a:t>4/10/22</a:t>
+              <a:t>4/12/2022</a:t>
             </a:fld>
             <a:endParaRPr lang="en-US" dirty="0"/>
           </a:p>
@@ -22802,7 +22979,7 @@
             <a:fld id="{B5898F52-2787-4BA2-BBBC-9395E9F86D50}" type="datetimeFigureOut">
               <a:rPr lang="en-US" smtClean="0"/>
               <a:pPr/>
-              <a:t>4/10/22</a:t>
+              <a:t>4/12/2022</a:t>
             </a:fld>
             <a:endParaRPr lang="en-US" dirty="0"/>
           </a:p>
@@ -22978,7 +23155,7 @@
           <a:p>
             <a:fld id="{B5898F52-2787-4BA2-BBBC-9395E9F86D50}" type="datetimeFigureOut">
               <a:rPr lang="en-US" smtClean="0"/>
-              <a:t>4/10/22</a:t>
+              <a:t>4/12/2022</a:t>
             </a:fld>
             <a:endParaRPr lang="en-US"/>
           </a:p>
@@ -23158,7 +23335,7 @@
           <a:p>
             <a:fld id="{B5898F52-2787-4BA2-BBBC-9395E9F86D50}" type="datetimeFigureOut">
               <a:rPr lang="en-US" smtClean="0"/>
-              <a:t>4/10/22</a:t>
+              <a:t>4/12/2022</a:t>
             </a:fld>
             <a:endParaRPr lang="en-US"/>
           </a:p>
@@ -23328,7 +23505,7 @@
           <a:p>
             <a:fld id="{B5898F52-2787-4BA2-BBBC-9395E9F86D50}" type="datetimeFigureOut">
               <a:rPr lang="en-US" smtClean="0"/>
-              <a:t>4/10/22</a:t>
+              <a:t>4/12/2022</a:t>
             </a:fld>
             <a:endParaRPr lang="en-US"/>
           </a:p>
@@ -23585,7 +23762,7 @@
           <a:p>
             <a:fld id="{B5898F52-2787-4BA2-BBBC-9395E9F86D50}" type="datetimeFigureOut">
               <a:rPr lang="en-US" smtClean="0"/>
-              <a:t>4/10/22</a:t>
+              <a:t>4/12/2022</a:t>
             </a:fld>
             <a:endParaRPr lang="en-US"/>
           </a:p>
@@ -23877,7 +24054,7 @@
           <a:p>
             <a:fld id="{B5898F52-2787-4BA2-BBBC-9395E9F86D50}" type="datetimeFigureOut">
               <a:rPr lang="en-US" smtClean="0"/>
-              <a:t>4/10/22</a:t>
+              <a:t>4/12/2022</a:t>
             </a:fld>
             <a:endParaRPr lang="en-US"/>
           </a:p>
@@ -24312,7 +24489,7 @@
           <a:p>
             <a:fld id="{B5898F52-2787-4BA2-BBBC-9395E9F86D50}" type="datetimeFigureOut">
               <a:rPr lang="en-US" smtClean="0"/>
-              <a:t>4/10/22</a:t>
+              <a:t>4/12/2022</a:t>
             </a:fld>
             <a:endParaRPr lang="en-US"/>
           </a:p>
@@ -24435,7 +24612,7 @@
           <a:p>
             <a:fld id="{B5898F52-2787-4BA2-BBBC-9395E9F86D50}" type="datetimeFigureOut">
               <a:rPr lang="en-US" smtClean="0"/>
-              <a:t>4/10/22</a:t>
+              <a:t>4/12/2022</a:t>
             </a:fld>
             <a:endParaRPr lang="en-US"/>
           </a:p>
@@ -24530,7 +24707,7 @@
           <a:p>
             <a:fld id="{B5898F52-2787-4BA2-BBBC-9395E9F86D50}" type="datetimeFigureOut">
               <a:rPr lang="en-US" smtClean="0"/>
-              <a:t>4/10/22</a:t>
+              <a:t>4/12/2022</a:t>
             </a:fld>
             <a:endParaRPr lang="en-US"/>
           </a:p>
@@ -24813,7 +24990,7 @@
           <a:p>
             <a:fld id="{B5898F52-2787-4BA2-BBBC-9395E9F86D50}" type="datetimeFigureOut">
               <a:rPr lang="en-US" smtClean="0"/>
-              <a:t>4/10/22</a:t>
+              <a:t>4/12/2022</a:t>
             </a:fld>
             <a:endParaRPr lang="en-US"/>
           </a:p>
@@ -25109,7 +25286,7 @@
           <a:p>
             <a:fld id="{B5898F52-2787-4BA2-BBBC-9395E9F86D50}" type="datetimeFigureOut">
               <a:rPr lang="en-US" smtClean="0"/>
-              <a:t>4/10/22</a:t>
+              <a:t>4/12/2022</a:t>
             </a:fld>
             <a:endParaRPr lang="en-US"/>
           </a:p>
@@ -25341,7 +25518,7 @@
             <a:fld id="{B5898F52-2787-4BA2-BBBC-9395E9F86D50}" type="datetimeFigureOut">
               <a:rPr lang="en-US" smtClean="0"/>
               <a:pPr/>
-              <a:t>4/10/22</a:t>
+              <a:t>4/12/2022</a:t>
             </a:fld>
             <a:endParaRPr lang="en-US" dirty="0"/>
           </a:p>
@@ -27117,7 +27294,7 @@
             <p:ph idx="1"/>
             <p:extLst>
               <p:ext uri="{D42A27DB-BD31-4B8C-83A1-F6EECF244321}">
-                <p14:modId xmlns:p14="http://schemas.microsoft.com/office/powerpoint/2010/main" val="4278053698"/>
+                <p14:modId xmlns:p14="http://schemas.microsoft.com/office/powerpoint/2010/main" val="290706218"/>
               </p:ext>
             </p:extLst>
           </p:nvPr>

</xml_diff>